<commit_message>
update lagrangian OT poster
</commit_message>
<xml_diff>
--- a/2024.lagrangian-ot-poster.pptx
+++ b/2024.lagrangian-ot-poster.pptx
@@ -974,7 +974,7 @@
           <a:p>
             <a:fld id="{3A871A45-7C7B-4E7C-83A3-05F7BCDEEBB5}" type="datetimeFigureOut">
               <a:rPr lang="en-US" smtClean="0"/>
-              <a:t>7/6/24</a:t>
+              <a:t>7/17/24</a:t>
             </a:fld>
             <a:endParaRPr lang="en-US"/>
           </a:p>
@@ -1461,7 +1461,7 @@
           <a:p>
             <a:fld id="{C764DE79-268F-4C1A-8933-263129D2AF90}" type="datetimeFigureOut">
               <a:rPr lang="en-US" smtClean="0"/>
-              <a:t>7/6/24</a:t>
+              <a:t>7/17/24</a:t>
             </a:fld>
             <a:endParaRPr lang="en-US"/>
           </a:p>
@@ -1631,7 +1631,7 @@
           <a:p>
             <a:fld id="{C764DE79-268F-4C1A-8933-263129D2AF90}" type="datetimeFigureOut">
               <a:rPr lang="en-US" smtClean="0"/>
-              <a:t>7/6/24</a:t>
+              <a:t>7/17/24</a:t>
             </a:fld>
             <a:endParaRPr lang="en-US"/>
           </a:p>
@@ -1811,7 +1811,7 @@
           <a:p>
             <a:fld id="{C764DE79-268F-4C1A-8933-263129D2AF90}" type="datetimeFigureOut">
               <a:rPr lang="en-US" smtClean="0"/>
-              <a:t>7/6/24</a:t>
+              <a:t>7/17/24</a:t>
             </a:fld>
             <a:endParaRPr lang="en-US"/>
           </a:p>
@@ -2499,7 +2499,7 @@
           <a:p>
             <a:fld id="{C764DE79-268F-4C1A-8933-263129D2AF90}" type="datetimeFigureOut">
               <a:rPr lang="en-US" smtClean="0"/>
-              <a:t>7/6/24</a:t>
+              <a:t>7/17/24</a:t>
             </a:fld>
             <a:endParaRPr lang="en-US"/>
           </a:p>
@@ -2743,7 +2743,7 @@
           <a:p>
             <a:fld id="{C764DE79-268F-4C1A-8933-263129D2AF90}" type="datetimeFigureOut">
               <a:rPr lang="en-US" smtClean="0"/>
-              <a:t>7/6/24</a:t>
+              <a:t>7/17/24</a:t>
             </a:fld>
             <a:endParaRPr lang="en-US"/>
           </a:p>
@@ -2975,7 +2975,7 @@
           <a:p>
             <a:fld id="{C764DE79-268F-4C1A-8933-263129D2AF90}" type="datetimeFigureOut">
               <a:rPr lang="en-US" smtClean="0"/>
-              <a:t>7/6/24</a:t>
+              <a:t>7/17/24</a:t>
             </a:fld>
             <a:endParaRPr lang="en-US"/>
           </a:p>
@@ -3355,7 +3355,7 @@
           <a:p>
             <a:fld id="{C764DE79-268F-4C1A-8933-263129D2AF90}" type="datetimeFigureOut">
               <a:rPr lang="en-US" smtClean="0"/>
-              <a:t>7/6/24</a:t>
+              <a:t>7/17/24</a:t>
             </a:fld>
             <a:endParaRPr lang="en-US"/>
           </a:p>
@@ -3473,7 +3473,7 @@
           <a:p>
             <a:fld id="{C764DE79-268F-4C1A-8933-263129D2AF90}" type="datetimeFigureOut">
               <a:rPr lang="en-US" smtClean="0"/>
-              <a:t>7/6/24</a:t>
+              <a:t>7/17/24</a:t>
             </a:fld>
             <a:endParaRPr lang="en-US"/>
           </a:p>
@@ -3581,7 +3581,7 @@
           <a:p>
             <a:fld id="{C764DE79-268F-4C1A-8933-263129D2AF90}" type="datetimeFigureOut">
               <a:rPr lang="en-US" smtClean="0"/>
-              <a:t>7/6/24</a:t>
+              <a:t>7/17/24</a:t>
             </a:fld>
             <a:endParaRPr lang="en-US"/>
           </a:p>
@@ -3858,7 +3858,7 @@
           <a:p>
             <a:fld id="{C764DE79-268F-4C1A-8933-263129D2AF90}" type="datetimeFigureOut">
               <a:rPr lang="en-US" smtClean="0"/>
-              <a:t>7/6/24</a:t>
+              <a:t>7/17/24</a:t>
             </a:fld>
             <a:endParaRPr lang="en-US"/>
           </a:p>
@@ -4115,7 +4115,7 @@
           <a:p>
             <a:fld id="{C764DE79-268F-4C1A-8933-263129D2AF90}" type="datetimeFigureOut">
               <a:rPr lang="en-US" smtClean="0"/>
-              <a:t>7/6/24</a:t>
+              <a:t>7/17/24</a:t>
             </a:fld>
             <a:endParaRPr lang="en-US"/>
           </a:p>
@@ -4328,7 +4328,7 @@
           <a:p>
             <a:fld id="{C764DE79-268F-4C1A-8933-263129D2AF90}" type="datetimeFigureOut">
               <a:rPr lang="en-US" smtClean="0"/>
-              <a:t>7/6/24</a:t>
+              <a:t>7/17/24</a:t>
             </a:fld>
             <a:endParaRPr lang="en-US"/>
           </a:p>
@@ -4766,45 +4766,6 @@
           </a:prstGeom>
         </p:spPr>
       </p:pic>
-      <p:pic>
-        <p:nvPicPr>
-          <p:cNvPr id="10" name="Graphic 9">
-            <a:extLst>
-              <a:ext uri="{FF2B5EF4-FFF2-40B4-BE49-F238E27FC236}">
-                <a16:creationId xmlns:a16="http://schemas.microsoft.com/office/drawing/2014/main" id="{F6DBF264-9C27-3B76-F670-6920EB49643A}"/>
-              </a:ext>
-            </a:extLst>
-          </p:cNvPr>
-          <p:cNvPicPr>
-            <a:picLocks noChangeAspect="1"/>
-          </p:cNvPicPr>
-          <p:nvPr/>
-        </p:nvPicPr>
-        <p:blipFill>
-          <a:blip r:embed="rId4">
-            <a:extLst>
-              <a:ext uri="{28A0092B-C50C-407E-A947-70E740481C1C}">
-                <a14:useLocalDpi xmlns:a14="http://schemas.microsoft.com/office/drawing/2010/main" val="0"/>
-              </a:ext>
-              <a:ext uri="{96DAC541-7B7A-43D3-8B79-37D633B846F1}">
-                <asvg:svgBlip xmlns:asvg="http://schemas.microsoft.com/office/drawing/2016/SVG/main" r:embed="rId5"/>
-              </a:ext>
-            </a:extLst>
-          </a:blip>
-          <a:stretch>
-            <a:fillRect/>
-          </a:stretch>
-        </p:blipFill>
-        <p:spPr>
-          <a:xfrm>
-            <a:off x="25030858" y="675459"/>
-            <a:ext cx="3872954" cy="3872954"/>
-          </a:xfrm>
-          <a:prstGeom prst="rect">
-            <a:avLst/>
-          </a:prstGeom>
-        </p:spPr>
-      </p:pic>
       <p:sp>
         <p:nvSpPr>
           <p:cNvPr id="63" name="Content Placeholder 14">
@@ -4971,7 +4932,7 @@
           </a:lstStyle>
           <a:p>
             <a:r>
-              <a:rPr lang="en-US" sz="14953" b="1">
+              <a:rPr lang="en-US" sz="14953" b="1" dirty="0">
                 <a:solidFill>
                   <a:srgbClr val="374C81"/>
                 </a:solidFill>
@@ -5527,24 +5488,24 @@
               </a:spcBef>
             </a:pPr>
             <a:r>
-              <a:rPr lang="en-US" sz="5201" b="1">
+              <a:rPr lang="en-US" sz="5201" b="1" dirty="0">
                 <a:latin typeface="Source Sans Pro" panose="020B0503030403020204" pitchFamily="34" charset="0"/>
                 <a:ea typeface="Source Sans Pro" panose="020B0503030403020204" pitchFamily="34" charset="0"/>
               </a:rPr>
-              <a:t>Aram-Alexandre Pooladian	Carles Domingo-Enrich	Ricky T. Q. Chen 	Brandon Amos</a:t>
+              <a:t>Aram-Alexandre Pooladian	Carles Domingo-Enrich		Ricky T. Q. Chen 		Brandon Amos</a:t>
             </a:r>
             <a:br>
-              <a:rPr lang="en-US" sz="5201" b="1">
+              <a:rPr lang="en-US" sz="5201" b="1" dirty="0">
                 <a:latin typeface="Source Sans Pro" panose="020B0503030403020204" pitchFamily="34" charset="0"/>
                 <a:ea typeface="Source Sans Pro" panose="020B0503030403020204" pitchFamily="34" charset="0"/>
               </a:rPr>
             </a:br>
             <a:r>
-              <a:rPr lang="en-US" sz="5201">
+              <a:rPr lang="en-US" sz="5201" dirty="0">
                 <a:latin typeface="Source Sans Pro" panose="020B0503030403020204" pitchFamily="34" charset="0"/>
                 <a:ea typeface="Source Sans Pro" panose="020B0503030403020204" pitchFamily="34" charset="0"/>
               </a:rPr>
-              <a:t>NYU, Meta AI									NYU, Meta AI							Meta AI						Meta AI</a:t>
+              <a:t>NYU, Meta AI											NYU, Meta AI									Meta AI								Meta AI</a:t>
             </a:r>
           </a:p>
         </p:txBody>
@@ -5565,7 +5526,7 @@
         </p:nvSpPr>
         <p:spPr>
           <a:xfrm>
-            <a:off x="25518658" y="205366"/>
+            <a:off x="23658404" y="526720"/>
             <a:ext cx="2523841" cy="941319"/>
           </a:xfrm>
           <a:prstGeom prst="rect">
@@ -5716,9 +5677,9 @@
           <a:p>
             <a:pPr algn="ctr"/>
             <a:r>
-              <a:rPr lang="en-US" sz="4681">
-                <a:solidFill>
-                  <a:srgbClr val="3572B7"/>
+              <a:rPr lang="en-US" sz="4681" dirty="0">
+                <a:solidFill>
+                  <a:srgbClr val="364B81"/>
                 </a:solidFill>
                 <a:latin typeface="Menlo" panose="020B0609030804020204" pitchFamily="49" charset="0"/>
                 <a:ea typeface="Menlo" panose="020B0609030804020204" pitchFamily="49" charset="0"/>
@@ -6152,8 +6113,8 @@
           </a:p>
         </p:txBody>
       </p:sp>
-      <mc:AlternateContent xmlns:mc="http://schemas.openxmlformats.org/markup-compatibility/2006">
-        <mc:Choice xmlns:a14="http://schemas.microsoft.com/office/drawing/2010/main" Requires="a14">
+      <mc:AlternateContent xmlns:mc="http://schemas.openxmlformats.org/markup-compatibility/2006" xmlns:a14="http://schemas.microsoft.com/office/drawing/2010/main">
+        <mc:Choice Requires="a14">
           <p:sp>
             <p:nvSpPr>
               <p:cNvPr id="3" name="Content Placeholder 12">
@@ -6385,7 +6346,7 @@
             </p:txBody>
           </p:sp>
         </mc:Choice>
-        <mc:Fallback>
+        <mc:Fallback xmlns="">
           <p:sp>
             <p:nvSpPr>
               <p:cNvPr id="3" name="Content Placeholder 12">
@@ -7463,7 +7424,7 @@
             <p:spPr>
               <a:xfrm>
                 <a:off x="19775036" y="13761638"/>
-                <a:ext cx="9120236" cy="1256049"/>
+                <a:ext cx="9120236" cy="1319015"/>
               </a:xfrm>
               <a:prstGeom prst="rect">
                 <a:avLst/>
@@ -7480,7 +7441,7 @@
               <a:lstStyle/>
               <a:p>
                 <a:r>
-                  <a:rPr lang="en-US" sz="3641">
+                  <a:rPr lang="en-US" sz="3641" dirty="0">
                     <a:solidFill>
                       <a:schemeClr val="tx1">
                         <a:lumMod val="50000"/>
@@ -7488,7 +7449,7 @@
                       </a:schemeClr>
                     </a:solidFill>
                   </a:rPr>
-                  <a:t>Encompasses </a:t>
+                  <a:t>encompasses </a:t>
                 </a:r>
                 <a14:m>
                   <m:oMath xmlns:m="http://schemas.openxmlformats.org/officeDocument/2006/math">
@@ -7502,7 +7463,7 @@
                                 <a:lumOff val="50000"/>
                               </a:schemeClr>
                             </a:solidFill>
-                            <a:latin typeface="Cambria Math" panose="02040503050406030204" pitchFamily="18" charset="0"/>
+                            <a:latin typeface="Cambria Math" panose="02000503000000000000" pitchFamily="2" charset="77"/>
                           </a:rPr>
                         </m:ctrlPr>
                       </m:sSubPr>
@@ -7538,7 +7499,7 @@
                   </m:oMath>
                 </a14:m>
                 <a:r>
-                  <a:rPr lang="en-US" sz="3641">
+                  <a:rPr lang="en-US" sz="3641" dirty="0">
                     <a:solidFill>
                       <a:schemeClr val="tx1">
                         <a:lumMod val="50000"/>
@@ -7549,7 +7510,7 @@
                   <a:t> norms, barrier functions,</a:t>
                 </a:r>
                 <a:br>
-                  <a:rPr lang="en-US" sz="3641">
+                  <a:rPr lang="en-US" sz="3641" dirty="0">
                     <a:solidFill>
                       <a:schemeClr val="tx1">
                         <a:lumMod val="50000"/>
@@ -7559,7 +7520,7 @@
                   </a:rPr>
                 </a:br>
                 <a:r>
-                  <a:rPr lang="en-US" sz="3641">
+                  <a:rPr lang="en-US" sz="3641" dirty="0">
                     <a:solidFill>
                       <a:schemeClr val="tx1">
                         <a:lumMod val="50000"/>
@@ -7591,7 +7552,7 @@
             <p:spPr>
               <a:xfrm>
                 <a:off x="19775036" y="13761638"/>
-                <a:ext cx="9120236" cy="1256049"/>
+                <a:ext cx="9120236" cy="1319015"/>
               </a:xfrm>
               <a:prstGeom prst="rect">
                 <a:avLst/>
@@ -7599,7 +7560,7 @@
               <a:blipFill>
                 <a:blip r:embed="rId17"/>
                 <a:stretch>
-                  <a:fillRect l="-2086" t="-6000" b="-18000"/>
+                  <a:fillRect l="-2086" t="-3810" b="-17143"/>
                 </a:stretch>
               </a:blipFill>
               <a:ln w="38100">
@@ -7621,8 +7582,8 @@
           </p:sp>
         </mc:Fallback>
       </mc:AlternateContent>
-      <mc:AlternateContent xmlns:mc="http://schemas.openxmlformats.org/markup-compatibility/2006">
-        <mc:Choice xmlns:a14="http://schemas.microsoft.com/office/drawing/2010/main" Requires="a14">
+      <mc:AlternateContent xmlns:mc="http://schemas.openxmlformats.org/markup-compatibility/2006" xmlns:a14="http://schemas.microsoft.com/office/drawing/2010/main">
+        <mc:Choice Requires="a14">
           <p:sp>
             <p:nvSpPr>
               <p:cNvPr id="11" name="Content Placeholder 12">
@@ -7806,7 +7767,7 @@
             </p:txBody>
           </p:sp>
         </mc:Choice>
-        <mc:Fallback>
+        <mc:Fallback xmlns="">
           <p:sp>
             <p:nvSpPr>
               <p:cNvPr id="11" name="Content Placeholder 12">
@@ -7851,8 +7812,8 @@
           </p:sp>
         </mc:Fallback>
       </mc:AlternateContent>
-      <mc:AlternateContent xmlns:mc="http://schemas.openxmlformats.org/markup-compatibility/2006">
-        <mc:Choice xmlns:a14="http://schemas.microsoft.com/office/drawing/2010/main" Requires="a14">
+      <mc:AlternateContent xmlns:mc="http://schemas.openxmlformats.org/markup-compatibility/2006" xmlns:a14="http://schemas.microsoft.com/office/drawing/2010/main">
+        <mc:Choice Requires="a14">
           <p:sp>
             <p:nvSpPr>
               <p:cNvPr id="24" name="TextBox 23">
@@ -7914,7 +7875,7 @@
                       <m:sSubPr>
                         <m:ctrlPr>
                           <a:rPr lang="en-US" sz="5201" i="1">
-                            <a:latin typeface="Cambria Math" panose="02040503050406030204" pitchFamily="18" charset="0"/>
+                            <a:latin typeface="Cambria Math" panose="02000503000000000000" pitchFamily="2" charset="77"/>
                             <a:ea typeface="Source Sans Pro" panose="020B0503030403020204" pitchFamily="34" charset="0"/>
                           </a:rPr>
                         </m:ctrlPr>
@@ -7953,7 +7914,7 @@
                       <m:sSubPr>
                         <m:ctrlPr>
                           <a:rPr lang="en-US" sz="5201" i="1">
-                            <a:latin typeface="Cambria Math" panose="02040503050406030204" pitchFamily="18" charset="0"/>
+                            <a:latin typeface="Cambria Math" panose="02000503000000000000" pitchFamily="2" charset="77"/>
                             <a:ea typeface="Source Sans Pro" panose="020B0503030403020204" pitchFamily="34" charset="0"/>
                           </a:rPr>
                         </m:ctrlPr>
@@ -7992,7 +7953,7 @@
                       <m:sSubPr>
                         <m:ctrlPr>
                           <a:rPr lang="en-US" sz="5201" i="1">
-                            <a:latin typeface="Cambria Math" panose="02040503050406030204" pitchFamily="18" charset="0"/>
+                            <a:latin typeface="Cambria Math" panose="02000503000000000000" pitchFamily="2" charset="77"/>
                             <a:ea typeface="Source Sans Pro" panose="020B0503030403020204" pitchFamily="34" charset="0"/>
                           </a:rPr>
                         </m:ctrlPr>
@@ -8029,7 +7990,7 @@
             </p:txBody>
           </p:sp>
         </mc:Choice>
-        <mc:Fallback>
+        <mc:Fallback xmlns="">
           <p:sp>
             <p:nvSpPr>
               <p:cNvPr id="24" name="TextBox 23">
@@ -8209,8 +8170,8 @@
           </a:prstGeom>
         </p:spPr>
       </p:pic>
-      <mc:AlternateContent xmlns:mc="http://schemas.openxmlformats.org/markup-compatibility/2006">
-        <mc:Choice xmlns:a14="http://schemas.microsoft.com/office/drawing/2010/main" Requires="a14">
+      <mc:AlternateContent xmlns:mc="http://schemas.openxmlformats.org/markup-compatibility/2006" xmlns:a14="http://schemas.microsoft.com/office/drawing/2010/main">
+        <mc:Choice Requires="a14">
           <p:sp>
             <p:nvSpPr>
               <p:cNvPr id="27" name="TextBox 26">
@@ -8347,7 +8308,7 @@
             </p:txBody>
           </p:sp>
         </mc:Choice>
-        <mc:Fallback>
+        <mc:Fallback xmlns="">
           <p:sp>
             <p:nvSpPr>
               <p:cNvPr id="27" name="TextBox 26">
@@ -8816,8 +8777,8 @@
           </a:p>
         </p:txBody>
       </p:sp>
-      <mc:AlternateContent xmlns:mc="http://schemas.openxmlformats.org/markup-compatibility/2006">
-        <mc:Choice xmlns:a14="http://schemas.microsoft.com/office/drawing/2010/main" Requires="a14">
+      <mc:AlternateContent xmlns:mc="http://schemas.openxmlformats.org/markup-compatibility/2006" xmlns:a14="http://schemas.microsoft.com/office/drawing/2010/main">
+        <mc:Choice Requires="a14">
           <p:sp>
             <p:nvSpPr>
               <p:cNvPr id="46" name="TextBox 45">
@@ -8880,7 +8841,7 @@
             </p:txBody>
           </p:sp>
         </mc:Choice>
-        <mc:Fallback>
+        <mc:Fallback xmlns="">
           <p:sp>
             <p:nvSpPr>
               <p:cNvPr id="46" name="TextBox 45">
@@ -8925,8 +8886,8 @@
           </p:sp>
         </mc:Fallback>
       </mc:AlternateContent>
-      <mc:AlternateContent xmlns:mc="http://schemas.openxmlformats.org/markup-compatibility/2006">
-        <mc:Choice xmlns:a14="http://schemas.microsoft.com/office/drawing/2010/main" Requires="a14">
+      <mc:AlternateContent xmlns:mc="http://schemas.openxmlformats.org/markup-compatibility/2006" xmlns:a14="http://schemas.microsoft.com/office/drawing/2010/main">
+        <mc:Choice Requires="a14">
           <p:sp>
             <p:nvSpPr>
               <p:cNvPr id="47" name="TextBox 46">
@@ -8989,7 +8950,7 @@
             </p:txBody>
           </p:sp>
         </mc:Choice>
-        <mc:Fallback>
+        <mc:Fallback xmlns="">
           <p:sp>
             <p:nvSpPr>
               <p:cNvPr id="47" name="TextBox 46">
@@ -9102,6 +9063,246 @@
               <a:schemeClr val="tx1"/>
             </a:solidFill>
           </a:ln>
+        </p:spPr>
+      </p:pic>
+      <p:pic>
+        <p:nvPicPr>
+          <p:cNvPr id="12" name="Picture 11">
+            <a:extLst>
+              <a:ext uri="{FF2B5EF4-FFF2-40B4-BE49-F238E27FC236}">
+                <a16:creationId xmlns:a16="http://schemas.microsoft.com/office/drawing/2014/main" id="{5B07185D-CE96-3AF8-71BF-C5C78BE1D893}"/>
+              </a:ext>
+            </a:extLst>
+          </p:cNvPr>
+          <p:cNvPicPr>
+            <a:picLocks noChangeAspect="1"/>
+          </p:cNvPicPr>
+          <p:nvPr/>
+        </p:nvPicPr>
+        <p:blipFill>
+          <a:blip r:embed="rId29"/>
+          <a:stretch>
+            <a:fillRect/>
+          </a:stretch>
+        </p:blipFill>
+        <p:spPr>
+          <a:xfrm>
+            <a:off x="26634796" y="1239483"/>
+            <a:ext cx="3148643" cy="3206951"/>
+          </a:xfrm>
+          <a:prstGeom prst="rect">
+            <a:avLst/>
+          </a:prstGeom>
+        </p:spPr>
+      </p:pic>
+      <p:sp>
+        <p:nvSpPr>
+          <p:cNvPr id="29" name="Content Placeholder 14">
+            <a:extLst>
+              <a:ext uri="{FF2B5EF4-FFF2-40B4-BE49-F238E27FC236}">
+                <a16:creationId xmlns:a16="http://schemas.microsoft.com/office/drawing/2014/main" id="{49AA6F18-C1E0-3972-706E-4A753FCBCB0F}"/>
+              </a:ext>
+            </a:extLst>
+          </p:cNvPr>
+          <p:cNvSpPr>
+            <a:spLocks noGrp="1"/>
+          </p:cNvSpPr>
+          <p:nvPr/>
+        </p:nvSpPr>
+        <p:spPr>
+          <a:xfrm>
+            <a:off x="26949203" y="526720"/>
+            <a:ext cx="2523841" cy="941319"/>
+          </a:xfrm>
+          <a:prstGeom prst="rect">
+            <a:avLst/>
+          </a:prstGeom>
+        </p:spPr>
+        <p:txBody>
+          <a:bodyPr vert="horz" lIns="83838" tIns="41919" rIns="83838" bIns="41919" rtlCol="0">
+            <a:noAutofit/>
+          </a:bodyPr>
+          <a:lstStyle>
+            <a:lvl1pPr marL="0" indent="0" algn="l" defTabSz="457200" rtl="0" eaLnBrk="1" latinLnBrk="0" hangingPunct="1">
+              <a:spcBef>
+                <a:spcPts val="2800"/>
+              </a:spcBef>
+              <a:buFontTx/>
+              <a:buNone/>
+              <a:defRPr sz="2000" b="0" i="0" kern="1200">
+                <a:solidFill>
+                  <a:schemeClr val="tx1"/>
+                </a:solidFill>
+                <a:latin typeface="Helvetica Neue Light"/>
+                <a:ea typeface="+mn-ea"/>
+                <a:cs typeface="Helvetica Neue Light"/>
+              </a:defRPr>
+            </a:lvl1pPr>
+            <a:lvl2pPr marL="457200" indent="0" algn="l" defTabSz="457200" rtl="0" eaLnBrk="1" latinLnBrk="0" hangingPunct="1">
+              <a:spcBef>
+                <a:spcPts val="0"/>
+              </a:spcBef>
+              <a:buFont typeface="Arial"/>
+              <a:buNone/>
+              <a:defRPr sz="2000" b="0" i="0" kern="1200">
+                <a:solidFill>
+                  <a:schemeClr val="tx1"/>
+                </a:solidFill>
+                <a:latin typeface="Helvetica Neue Light"/>
+                <a:ea typeface="+mn-ea"/>
+                <a:cs typeface="Helvetica Neue Light"/>
+              </a:defRPr>
+            </a:lvl2pPr>
+            <a:lvl3pPr marL="914400" indent="0" algn="l" defTabSz="457200" rtl="0" eaLnBrk="1" latinLnBrk="0" hangingPunct="1">
+              <a:spcBef>
+                <a:spcPct val="20000"/>
+              </a:spcBef>
+              <a:buFont typeface="Lucida Grande"/>
+              <a:buNone/>
+              <a:defRPr sz="2000" b="0" i="0" kern="1200">
+                <a:solidFill>
+                  <a:schemeClr val="tx1"/>
+                </a:solidFill>
+                <a:latin typeface="Helvetica Neue Light"/>
+                <a:ea typeface="+mn-ea"/>
+                <a:cs typeface="Helvetica Neue Light"/>
+              </a:defRPr>
+            </a:lvl3pPr>
+            <a:lvl4pPr marL="1371600" indent="0" algn="l" defTabSz="457200" rtl="0" eaLnBrk="1" latinLnBrk="0" hangingPunct="1">
+              <a:spcBef>
+                <a:spcPct val="20000"/>
+              </a:spcBef>
+              <a:buFont typeface="Wingdings" charset="2"/>
+              <a:buNone/>
+              <a:defRPr sz="2000" b="0" i="0" kern="1200">
+                <a:solidFill>
+                  <a:schemeClr val="tx1"/>
+                </a:solidFill>
+                <a:latin typeface="Helvetica Neue Light"/>
+                <a:ea typeface="+mn-ea"/>
+                <a:cs typeface="Helvetica Neue Light"/>
+              </a:defRPr>
+            </a:lvl4pPr>
+            <a:lvl5pPr marL="1828800" indent="0" algn="l" defTabSz="457200" rtl="0" eaLnBrk="1" latinLnBrk="0" hangingPunct="1">
+              <a:spcBef>
+                <a:spcPts val="0"/>
+              </a:spcBef>
+              <a:buFont typeface="Arial"/>
+              <a:buNone/>
+              <a:defRPr sz="2000" b="0" i="0" kern="1200">
+                <a:solidFill>
+                  <a:schemeClr val="tx1"/>
+                </a:solidFill>
+                <a:latin typeface="Helvetica Neue Light"/>
+                <a:ea typeface="+mn-ea"/>
+                <a:cs typeface="Helvetica Neue Light"/>
+              </a:defRPr>
+            </a:lvl5pPr>
+            <a:lvl6pPr marL="2514600" indent="-228600" algn="l" defTabSz="457200" rtl="0" eaLnBrk="1" latinLnBrk="0" hangingPunct="1">
+              <a:spcBef>
+                <a:spcPct val="20000"/>
+              </a:spcBef>
+              <a:buFont typeface="Arial"/>
+              <a:buChar char="•"/>
+              <a:defRPr sz="2000" kern="1200">
+                <a:solidFill>
+                  <a:schemeClr val="tx1"/>
+                </a:solidFill>
+                <a:latin typeface="+mn-lt"/>
+                <a:ea typeface="+mn-ea"/>
+                <a:cs typeface="+mn-cs"/>
+              </a:defRPr>
+            </a:lvl6pPr>
+            <a:lvl7pPr marL="2971800" indent="-228600" algn="l" defTabSz="457200" rtl="0" eaLnBrk="1" latinLnBrk="0" hangingPunct="1">
+              <a:spcBef>
+                <a:spcPct val="20000"/>
+              </a:spcBef>
+              <a:buFont typeface="Arial"/>
+              <a:buChar char="•"/>
+              <a:defRPr sz="2000" kern="1200">
+                <a:solidFill>
+                  <a:schemeClr val="tx1"/>
+                </a:solidFill>
+                <a:latin typeface="+mn-lt"/>
+                <a:ea typeface="+mn-ea"/>
+                <a:cs typeface="+mn-cs"/>
+              </a:defRPr>
+            </a:lvl7pPr>
+            <a:lvl8pPr marL="3429000" indent="-228600" algn="l" defTabSz="457200" rtl="0" eaLnBrk="1" latinLnBrk="0" hangingPunct="1">
+              <a:spcBef>
+                <a:spcPct val="20000"/>
+              </a:spcBef>
+              <a:buFont typeface="Arial"/>
+              <a:buChar char="•"/>
+              <a:defRPr sz="2000" kern="1200">
+                <a:solidFill>
+                  <a:schemeClr val="tx1"/>
+                </a:solidFill>
+                <a:latin typeface="+mn-lt"/>
+                <a:ea typeface="+mn-ea"/>
+                <a:cs typeface="+mn-cs"/>
+              </a:defRPr>
+            </a:lvl8pPr>
+            <a:lvl9pPr marL="3886200" indent="-228600" algn="l" defTabSz="457200" rtl="0" eaLnBrk="1" latinLnBrk="0" hangingPunct="1">
+              <a:spcBef>
+                <a:spcPct val="20000"/>
+              </a:spcBef>
+              <a:buFont typeface="Arial"/>
+              <a:buChar char="•"/>
+              <a:defRPr sz="2000" kern="1200">
+                <a:solidFill>
+                  <a:schemeClr val="tx1"/>
+                </a:solidFill>
+                <a:latin typeface="+mn-lt"/>
+                <a:ea typeface="+mn-ea"/>
+                <a:cs typeface="+mn-cs"/>
+              </a:defRPr>
+            </a:lvl9pPr>
+          </a:lstStyle>
+          <a:p>
+            <a:pPr algn="ctr"/>
+            <a:r>
+              <a:rPr lang="en-US" sz="4681" dirty="0">
+                <a:solidFill>
+                  <a:srgbClr val="364B81"/>
+                </a:solidFill>
+                <a:latin typeface="Menlo" panose="020B0609030804020204" pitchFamily="49" charset="0"/>
+                <a:ea typeface="Menlo" panose="020B0609030804020204" pitchFamily="49" charset="0"/>
+                <a:cs typeface="Menlo" panose="020B0609030804020204" pitchFamily="49" charset="0"/>
+              </a:rPr>
+              <a:t>code</a:t>
+            </a:r>
+          </a:p>
+        </p:txBody>
+      </p:sp>
+      <p:pic>
+        <p:nvPicPr>
+          <p:cNvPr id="30" name="Picture 29">
+            <a:extLst>
+              <a:ext uri="{FF2B5EF4-FFF2-40B4-BE49-F238E27FC236}">
+                <a16:creationId xmlns:a16="http://schemas.microsoft.com/office/drawing/2014/main" id="{C011A201-A4BB-BEA6-A503-1CBA054142C9}"/>
+              </a:ext>
+            </a:extLst>
+          </p:cNvPr>
+          <p:cNvPicPr>
+            <a:picLocks noChangeAspect="1"/>
+          </p:cNvPicPr>
+          <p:nvPr/>
+        </p:nvPicPr>
+        <p:blipFill>
+          <a:blip r:embed="rId30"/>
+          <a:stretch>
+            <a:fillRect/>
+          </a:stretch>
+        </p:blipFill>
+        <p:spPr>
+          <a:xfrm>
+            <a:off x="23246435" y="1260424"/>
+            <a:ext cx="3070678" cy="3098342"/>
+          </a:xfrm>
+          <a:prstGeom prst="rect">
+            <a:avLst/>
+          </a:prstGeom>
         </p:spPr>
       </p:pic>
     </p:spTree>

</xml_diff>